<commit_message>
Updated notebooks to allow for export of code blocks and plots as HTML files.
</commit_message>
<xml_diff>
--- a/Final Presentation.pptx
+++ b/Final Presentation.pptx
@@ -13,6 +13,7 @@
     <p:sldId id="261" r:id="rId7"/>
     <p:sldId id="262" r:id="rId8"/>
     <p:sldId id="263" r:id="rId9"/>
+    <p:sldId id="264" r:id="rId10"/>
   </p:sldIdLst>
   <p:sldSz cx="12192000" cy="6858000"/>
   <p:notesSz cx="6858000" cy="9144000"/>
@@ -111,6 +112,11 @@
       </a:defRPr>
     </a:lvl9pPr>
   </p:defaultTextStyle>
+  <p:extLst>
+    <p:ext uri="{EFAFB233-063F-42B5-8137-9DF3F51BA10A}">
+      <p15:sldGuideLst xmlns:p15="http://schemas.microsoft.com/office/powerpoint/2012/main"/>
+    </p:ext>
+  </p:extLst>
 </p:presentation>
 </file>
 
@@ -284,7 +290,7 @@
             <a:fld id="{87DE6118-2437-4B30-8E3C-4D2BE6020583}" type="datetimeFigureOut">
               <a:rPr lang="en-US" dirty="0"/>
               <a:pPr/>
-              <a:t>12/3/2023</a:t>
+              <a:t>12/8/2023</a:t>
             </a:fld>
             <a:endParaRPr lang="en-US" dirty="0"/>
           </a:p>
@@ -610,7 +616,7 @@
           <a:p>
             <a:fld id="{87DE6118-2437-4B30-8E3C-4D2BE6020583}" type="datetimeFigureOut">
               <a:rPr lang="en-US" dirty="0"/>
-              <a:t>12/3/2023</a:t>
+              <a:t>12/8/2023</a:t>
             </a:fld>
             <a:endParaRPr lang="en-US" dirty="0"/>
           </a:p>
@@ -785,7 +791,7 @@
           <a:p>
             <a:fld id="{87DE6118-2437-4B30-8E3C-4D2BE6020583}" type="datetimeFigureOut">
               <a:rPr lang="en-US" dirty="0"/>
-              <a:t>12/3/2023</a:t>
+              <a:t>12/8/2023</a:t>
             </a:fld>
             <a:endParaRPr lang="en-US" dirty="0"/>
           </a:p>
@@ -950,7 +956,7 @@
           <a:p>
             <a:fld id="{87DE6118-2437-4B30-8E3C-4D2BE6020583}" type="datetimeFigureOut">
               <a:rPr lang="en-US" dirty="0"/>
-              <a:t>12/3/2023</a:t>
+              <a:t>12/8/2023</a:t>
             </a:fld>
             <a:endParaRPr lang="en-US" dirty="0"/>
           </a:p>
@@ -1223,7 +1229,7 @@
             <a:fld id="{87DE6118-2437-4B30-8E3C-4D2BE6020583}" type="datetimeFigureOut">
               <a:rPr lang="en-US" dirty="0"/>
               <a:pPr/>
-              <a:t>12/3/2023</a:t>
+              <a:t>12/8/2023</a:t>
             </a:fld>
             <a:endParaRPr lang="en-US" dirty="0"/>
           </a:p>
@@ -1613,7 +1619,7 @@
           <a:p>
             <a:fld id="{87DE6118-2437-4B30-8E3C-4D2BE6020583}" type="datetimeFigureOut">
               <a:rPr lang="en-US" dirty="0"/>
-              <a:t>12/3/2023</a:t>
+              <a:t>12/8/2023</a:t>
             </a:fld>
             <a:endParaRPr lang="en-US" dirty="0"/>
           </a:p>
@@ -2085,7 +2091,7 @@
           <a:p>
             <a:fld id="{87DE6118-2437-4B30-8E3C-4D2BE6020583}" type="datetimeFigureOut">
               <a:rPr lang="en-US" dirty="0"/>
-              <a:t>12/3/2023</a:t>
+              <a:t>12/8/2023</a:t>
             </a:fld>
             <a:endParaRPr lang="en-US" dirty="0"/>
           </a:p>
@@ -2198,7 +2204,7 @@
           <a:p>
             <a:fld id="{87DE6118-2437-4B30-8E3C-4D2BE6020583}" type="datetimeFigureOut">
               <a:rPr lang="en-US" dirty="0"/>
-              <a:t>12/3/2023</a:t>
+              <a:t>12/8/2023</a:t>
             </a:fld>
             <a:endParaRPr lang="en-US" dirty="0"/>
           </a:p>
@@ -2288,7 +2294,7 @@
           <a:p>
             <a:fld id="{87DE6118-2437-4B30-8E3C-4D2BE6020583}" type="datetimeFigureOut">
               <a:rPr lang="en-US" dirty="0"/>
-              <a:t>12/3/2023</a:t>
+              <a:t>12/8/2023</a:t>
             </a:fld>
             <a:endParaRPr lang="en-US" dirty="0"/>
           </a:p>
@@ -2630,7 +2636,7 @@
             <a:fld id="{87DE6118-2437-4B30-8E3C-4D2BE6020583}" type="datetimeFigureOut">
               <a:rPr lang="en-US" dirty="0"/>
               <a:pPr/>
-              <a:t>12/3/2023</a:t>
+              <a:t>12/8/2023</a:t>
             </a:fld>
             <a:endParaRPr lang="en-US" dirty="0"/>
           </a:p>
@@ -3015,7 +3021,7 @@
             <a:fld id="{87DE6118-2437-4B30-8E3C-4D2BE6020583}" type="datetimeFigureOut">
               <a:rPr lang="en-US" dirty="0"/>
               <a:pPr/>
-              <a:t>12/3/2023</a:t>
+              <a:t>12/8/2023</a:t>
             </a:fld>
             <a:endParaRPr lang="en-US" dirty="0"/>
           </a:p>
@@ -3290,7 +3296,7 @@
             <a:fld id="{87DE6118-2437-4B30-8E3C-4D2BE6020583}" type="datetimeFigureOut">
               <a:rPr lang="en-US" dirty="0"/>
               <a:pPr/>
-              <a:t>12/3/2023</a:t>
+              <a:t>12/8/2023</a:t>
             </a:fld>
             <a:endParaRPr lang="en-US" dirty="0"/>
           </a:p>
@@ -4844,6 +4850,201 @@
 </p:sld>
 </file>
 
+<file path=ppt/slides/slide9.xml><?xml version="1.0" encoding="utf-8"?>
+<p:sld xmlns:a="http://schemas.openxmlformats.org/drawingml/2006/main" xmlns:r="http://schemas.openxmlformats.org/officeDocument/2006/relationships" xmlns:p="http://schemas.openxmlformats.org/presentationml/2006/main">
+  <p:cSld>
+    <p:spTree>
+      <p:nvGrpSpPr>
+        <p:cNvPr id="1" name=""/>
+        <p:cNvGrpSpPr/>
+        <p:nvPr/>
+      </p:nvGrpSpPr>
+      <p:grpSpPr>
+        <a:xfrm>
+          <a:off x="0" y="0"/>
+          <a:ext cx="0" cy="0"/>
+          <a:chOff x="0" y="0"/>
+          <a:chExt cx="0" cy="0"/>
+        </a:xfrm>
+      </p:grpSpPr>
+      <p:sp>
+        <p:nvSpPr>
+          <p:cNvPr id="2" name="Title 1">
+            <a:extLst>
+              <a:ext uri="{FF2B5EF4-FFF2-40B4-BE49-F238E27FC236}">
+                <a16:creationId xmlns:a16="http://schemas.microsoft.com/office/drawing/2014/main" id="{389F6E8B-6522-F570-2126-075C737E989F}"/>
+              </a:ext>
+            </a:extLst>
+          </p:cNvPr>
+          <p:cNvSpPr>
+            <a:spLocks noGrp="1"/>
+          </p:cNvSpPr>
+          <p:nvPr>
+            <p:ph type="title"/>
+          </p:nvPr>
+        </p:nvSpPr>
+        <p:spPr/>
+        <p:txBody>
+          <a:bodyPr/>
+          <a:lstStyle/>
+          <a:p>
+            <a:r>
+              <a:rPr lang="en-CA" dirty="0"/>
+              <a:t>Links to data source</a:t>
+            </a:r>
+          </a:p>
+        </p:txBody>
+      </p:sp>
+      <p:sp>
+        <p:nvSpPr>
+          <p:cNvPr id="3" name="Content Placeholder 2">
+            <a:extLst>
+              <a:ext uri="{FF2B5EF4-FFF2-40B4-BE49-F238E27FC236}">
+                <a16:creationId xmlns:a16="http://schemas.microsoft.com/office/drawing/2014/main" id="{1D01BD55-5567-21FB-AB5E-C7E91E8D8E9B}"/>
+              </a:ext>
+            </a:extLst>
+          </p:cNvPr>
+          <p:cNvSpPr>
+            <a:spLocks noGrp="1"/>
+          </p:cNvSpPr>
+          <p:nvPr>
+            <p:ph idx="1"/>
+          </p:nvPr>
+        </p:nvSpPr>
+        <p:spPr/>
+        <p:txBody>
+          <a:bodyPr>
+            <a:normAutofit fontScale="85000" lnSpcReduction="20000"/>
+          </a:bodyPr>
+          <a:lstStyle/>
+          <a:p>
+            <a:r>
+              <a:rPr lang="en-US" dirty="0"/>
+              <a:t>Onshore wind and solar capacity factors data collected from </a:t>
+            </a:r>
+            <a:r>
+              <a:rPr lang="en-US" dirty="0" err="1">
+                <a:hlinkClick r:id="rId2"/>
+              </a:rPr>
+              <a:t>model.energy</a:t>
+            </a:r>
+            <a:r>
+              <a:rPr lang="en-US" dirty="0"/>
+              <a:t>  </a:t>
+            </a:r>
+          </a:p>
+          <a:p>
+            <a:pPr lvl="1"/>
+            <a:r>
+              <a:rPr lang="en-US" dirty="0"/>
+              <a:t>2011 – 2014 data is available</a:t>
+            </a:r>
+          </a:p>
+          <a:p>
+            <a:pPr lvl="1"/>
+            <a:r>
+              <a:rPr lang="en-US" dirty="0"/>
+              <a:t>Selected Washington State as location due to proximity to BC</a:t>
+            </a:r>
+          </a:p>
+          <a:p>
+            <a:pPr lvl="1"/>
+            <a:r>
+              <a:rPr lang="en-US" dirty="0"/>
+              <a:t>Hourly resolution</a:t>
+            </a:r>
+          </a:p>
+          <a:p>
+            <a:r>
+              <a:rPr lang="en-US" dirty="0"/>
+              <a:t>Load data from BC Hydro Historical Transmission Data – Gross Telemetered Load</a:t>
+            </a:r>
+          </a:p>
+          <a:p>
+            <a:pPr lvl="1"/>
+            <a:r>
+              <a:rPr lang="en-US" dirty="0">
+                <a:hlinkClick r:id="rId3"/>
+              </a:rPr>
+              <a:t>BC Hydro Data</a:t>
+            </a:r>
+            <a:endParaRPr lang="en-US" dirty="0"/>
+          </a:p>
+          <a:p>
+            <a:pPr lvl="1"/>
+            <a:r>
+              <a:rPr lang="en-US" dirty="0"/>
+              <a:t>2014 used as the basis for Load Data</a:t>
+            </a:r>
+          </a:p>
+          <a:p>
+            <a:pPr lvl="1"/>
+            <a:r>
+              <a:rPr lang="en-US" dirty="0"/>
+              <a:t>Hourly resolution</a:t>
+            </a:r>
+          </a:p>
+          <a:p>
+            <a:r>
+              <a:rPr lang="en-US" dirty="0"/>
+              <a:t>Technology data provided by </a:t>
+            </a:r>
+            <a:r>
+              <a:rPr lang="en-US" dirty="0" err="1"/>
+              <a:t>PyPSA</a:t>
+            </a:r>
+            <a:r>
+              <a:rPr lang="en-US" dirty="0"/>
+              <a:t> from </a:t>
+            </a:r>
+            <a:r>
+              <a:rPr lang="en-US" dirty="0">
+                <a:hlinkClick r:id="rId4"/>
+              </a:rPr>
+              <a:t>GitHub</a:t>
+            </a:r>
+            <a:endParaRPr lang="en-US" dirty="0"/>
+          </a:p>
+          <a:p>
+            <a:pPr lvl="1"/>
+            <a:r>
+              <a:rPr lang="en-US" dirty="0"/>
+              <a:t>Includes VOM, FOM, Investment, CO</a:t>
+            </a:r>
+            <a:r>
+              <a:rPr lang="en-US" baseline="-25000" dirty="0"/>
+              <a:t>2</a:t>
+            </a:r>
+            <a:r>
+              <a:rPr lang="en-US" dirty="0"/>
+              <a:t> Intensity and many other data points for hundreds of technologies</a:t>
+            </a:r>
+          </a:p>
+          <a:p>
+            <a:pPr lvl="1"/>
+            <a:r>
+              <a:rPr lang="en-US" dirty="0"/>
+              <a:t>Data is available for 2030 through 2050 in 5 years increments</a:t>
+            </a:r>
+          </a:p>
+          <a:p>
+            <a:endParaRPr lang="en-CA" dirty="0"/>
+          </a:p>
+        </p:txBody>
+      </p:sp>
+    </p:spTree>
+    <p:extLst>
+      <p:ext uri="{BB962C8B-B14F-4D97-AF65-F5344CB8AC3E}">
+        <p14:creationId xmlns:p14="http://schemas.microsoft.com/office/powerpoint/2010/main" val="1940043851"/>
+      </p:ext>
+    </p:extLst>
+  </p:cSld>
+  <p:clrMapOvr>
+    <a:masterClrMapping/>
+  </p:clrMapOvr>
+</p:sld>
+</file>
+
 <file path=ppt/theme/theme1.xml><?xml version="1.0" encoding="utf-8"?>
 <a:theme xmlns:a="http://schemas.openxmlformats.org/drawingml/2006/main" name="Crop">
   <a:themeElements>

</xml_diff>